<commit_message>
updated instructions for new stems
</commit_message>
<xml_diff>
--- a/SVC_Instructions.pptx
+++ b/SVC_Instructions.pptx
@@ -312,7 +312,7 @@
           <a:p>
             <a:fld id="{7D1675BD-AD94-6D41-A03C-06E36DD00519}" type="datetimeFigureOut">
               <a:rPr lang="en-US" smtClean="0"/>
-              <a:t>7/3/18</a:t>
+              <a:t>7/5/18</a:t>
             </a:fld>
             <a:endParaRPr lang="en-US"/>
           </a:p>
@@ -480,7 +480,7 @@
           <a:p>
             <a:fld id="{7D1675BD-AD94-6D41-A03C-06E36DD00519}" type="datetimeFigureOut">
               <a:rPr lang="en-US" smtClean="0"/>
-              <a:t>7/3/18</a:t>
+              <a:t>7/5/18</a:t>
             </a:fld>
             <a:endParaRPr lang="en-US"/>
           </a:p>
@@ -658,7 +658,7 @@
           <a:p>
             <a:fld id="{7D1675BD-AD94-6D41-A03C-06E36DD00519}" type="datetimeFigureOut">
               <a:rPr lang="en-US" smtClean="0"/>
-              <a:t>7/3/18</a:t>
+              <a:t>7/5/18</a:t>
             </a:fld>
             <a:endParaRPr lang="en-US"/>
           </a:p>
@@ -826,7 +826,7 @@
           <a:p>
             <a:fld id="{7D1675BD-AD94-6D41-A03C-06E36DD00519}" type="datetimeFigureOut">
               <a:rPr lang="en-US" smtClean="0"/>
-              <a:t>7/3/18</a:t>
+              <a:t>7/5/18</a:t>
             </a:fld>
             <a:endParaRPr lang="en-US"/>
           </a:p>
@@ -1071,7 +1071,7 @@
           <a:p>
             <a:fld id="{7D1675BD-AD94-6D41-A03C-06E36DD00519}" type="datetimeFigureOut">
               <a:rPr lang="en-US" smtClean="0"/>
-              <a:t>7/3/18</a:t>
+              <a:t>7/5/18</a:t>
             </a:fld>
             <a:endParaRPr lang="en-US"/>
           </a:p>
@@ -1356,7 +1356,7 @@
           <a:p>
             <a:fld id="{7D1675BD-AD94-6D41-A03C-06E36DD00519}" type="datetimeFigureOut">
               <a:rPr lang="en-US" smtClean="0"/>
-              <a:t>7/3/18</a:t>
+              <a:t>7/5/18</a:t>
             </a:fld>
             <a:endParaRPr lang="en-US"/>
           </a:p>
@@ -1775,7 +1775,7 @@
           <a:p>
             <a:fld id="{7D1675BD-AD94-6D41-A03C-06E36DD00519}" type="datetimeFigureOut">
               <a:rPr lang="en-US" smtClean="0"/>
-              <a:t>7/3/18</a:t>
+              <a:t>7/5/18</a:t>
             </a:fld>
             <a:endParaRPr lang="en-US"/>
           </a:p>
@@ -1892,7 +1892,7 @@
           <a:p>
             <a:fld id="{7D1675BD-AD94-6D41-A03C-06E36DD00519}" type="datetimeFigureOut">
               <a:rPr lang="en-US" smtClean="0"/>
-              <a:t>7/3/18</a:t>
+              <a:t>7/5/18</a:t>
             </a:fld>
             <a:endParaRPr lang="en-US"/>
           </a:p>
@@ -1987,7 +1987,7 @@
           <a:p>
             <a:fld id="{7D1675BD-AD94-6D41-A03C-06E36DD00519}" type="datetimeFigureOut">
               <a:rPr lang="en-US" smtClean="0"/>
-              <a:t>7/3/18</a:t>
+              <a:t>7/5/18</a:t>
             </a:fld>
             <a:endParaRPr lang="en-US"/>
           </a:p>
@@ -2262,7 +2262,7 @@
           <a:p>
             <a:fld id="{7D1675BD-AD94-6D41-A03C-06E36DD00519}" type="datetimeFigureOut">
               <a:rPr lang="en-US" smtClean="0"/>
-              <a:t>7/3/18</a:t>
+              <a:t>7/5/18</a:t>
             </a:fld>
             <a:endParaRPr lang="en-US"/>
           </a:p>
@@ -2514,7 +2514,7 @@
           <a:p>
             <a:fld id="{7D1675BD-AD94-6D41-A03C-06E36DD00519}" type="datetimeFigureOut">
               <a:rPr lang="en-US" smtClean="0"/>
-              <a:t>7/3/18</a:t>
+              <a:t>7/5/18</a:t>
             </a:fld>
             <a:endParaRPr lang="en-US"/>
           </a:p>
@@ -2725,7 +2725,7 @@
           <a:p>
             <a:fld id="{7D1675BD-AD94-6D41-A03C-06E36DD00519}" type="datetimeFigureOut">
               <a:rPr lang="en-US" smtClean="0"/>
-              <a:t>7/3/18</a:t>
+              <a:t>7/5/18</a:t>
             </a:fld>
             <a:endParaRPr lang="en-US"/>
           </a:p>
@@ -3410,7 +3410,7 @@
         </p:blipFill>
         <p:spPr>
           <a:xfrm>
-            <a:off x="1825993" y="2292454"/>
+            <a:off x="1886953" y="2292454"/>
             <a:ext cx="1371600" cy="1371600"/>
           </a:xfrm>
           <a:prstGeom prst="rect">
@@ -3426,8 +3426,8 @@
         </p:nvSpPr>
         <p:spPr>
           <a:xfrm>
-            <a:off x="451586" y="3797358"/>
-            <a:ext cx="4120414" cy="769441"/>
+            <a:off x="1021048" y="3797358"/>
+            <a:ext cx="3103414" cy="553998"/>
           </a:xfrm>
           <a:prstGeom prst="rect">
             <a:avLst/>
@@ -3442,14 +3442,14 @@
           <a:p>
             <a:pPr algn="ctr"/>
             <a:r>
-              <a:rPr lang="en-US" sz="4400" dirty="0">
+              <a:rPr lang="en-US" sz="3000" dirty="0">
                 <a:solidFill>
                   <a:srgbClr val="5732C7"/>
                 </a:solidFill>
                 <a:latin typeface="Futura"/>
                 <a:cs typeface="Futura"/>
               </a:rPr>
-              <a:t>true about me?</a:t>
+              <a:t>Usually, I (am)…</a:t>
             </a:r>
           </a:p>
         </p:txBody>
@@ -3482,7 +3482,7 @@
         </p:blipFill>
         <p:spPr>
           <a:xfrm>
-            <a:off x="5905654" y="2015191"/>
+            <a:off x="5552086" y="2015191"/>
             <a:ext cx="1828800" cy="1828800"/>
           </a:xfrm>
           <a:prstGeom prst="rect">
@@ -3504,8 +3504,8 @@
         </p:nvSpPr>
         <p:spPr>
           <a:xfrm>
-            <a:off x="4929097" y="3797358"/>
-            <a:ext cx="3801366" cy="769441"/>
+            <a:off x="4432229" y="3797358"/>
+            <a:ext cx="4087979" cy="553998"/>
           </a:xfrm>
           <a:prstGeom prst="rect">
             <a:avLst/>
@@ -3520,14 +3520,14 @@
           <a:p>
             <a:pPr algn="ctr"/>
             <a:r>
-              <a:rPr lang="en-US" sz="4400" dirty="0">
+              <a:rPr lang="en-US" sz="3000" dirty="0">
                 <a:solidFill>
                   <a:srgbClr val="F67D2A"/>
                 </a:solidFill>
                 <a:latin typeface="Futura"/>
                 <a:cs typeface="Futura"/>
               </a:rPr>
-              <a:t>can it change?</a:t>
+              <a:t>Usually, can change…</a:t>
             </a:r>
           </a:p>
         </p:txBody>
@@ -3600,8 +3600,8 @@
         </p:nvSpPr>
         <p:spPr>
           <a:xfrm>
-            <a:off x="2511793" y="3797358"/>
-            <a:ext cx="4120414" cy="769441"/>
+            <a:off x="2338892" y="3797358"/>
+            <a:ext cx="4466224" cy="769441"/>
           </a:xfrm>
           <a:prstGeom prst="rect">
             <a:avLst/>
@@ -3623,7 +3623,7 @@
                 <a:latin typeface="Futura"/>
                 <a:cs typeface="Futura"/>
               </a:rPr>
-              <a:t>true about me?</a:t>
+              <a:t>Usually, I (am)…</a:t>
             </a:r>
           </a:p>
         </p:txBody>
@@ -4155,8 +4155,8 @@
         </p:nvSpPr>
         <p:spPr>
           <a:xfrm>
-            <a:off x="2671319" y="3797358"/>
-            <a:ext cx="3801366" cy="769441"/>
+            <a:off x="1620655" y="3797358"/>
+            <a:ext cx="5902706" cy="769441"/>
           </a:xfrm>
           <a:prstGeom prst="rect">
             <a:avLst/>
@@ -4178,7 +4178,7 @@
                 <a:latin typeface="Futura"/>
                 <a:cs typeface="Futura"/>
               </a:rPr>
-              <a:t>can it change?</a:t>
+              <a:t>Usually, can change…</a:t>
             </a:r>
           </a:p>
         </p:txBody>

</xml_diff>